<commit_message>
added more slides to tutorial 3
</commit_message>
<xml_diff>
--- a/03-UML.pptx
+++ b/03-UML.pptx
@@ -5,7 +5,7 @@
     <p:sldMasterId id="2147483912" r:id="rId4"/>
   </p:sldMasterIdLst>
   <p:notesMasterIdLst>
-    <p:notesMasterId r:id="rId19"/>
+    <p:notesMasterId r:id="rId22"/>
   </p:notesMasterIdLst>
   <p:sldIdLst>
     <p:sldId id="256" r:id="rId5"/>
@@ -15,13 +15,16 @@
     <p:sldId id="308" r:id="rId9"/>
     <p:sldId id="294" r:id="rId10"/>
     <p:sldId id="282" r:id="rId11"/>
-    <p:sldId id="305" r:id="rId12"/>
-    <p:sldId id="310" r:id="rId13"/>
-    <p:sldId id="311" r:id="rId14"/>
-    <p:sldId id="312" r:id="rId15"/>
-    <p:sldId id="309" r:id="rId16"/>
-    <p:sldId id="289" r:id="rId17"/>
-    <p:sldId id="279" r:id="rId18"/>
+    <p:sldId id="314" r:id="rId12"/>
+    <p:sldId id="305" r:id="rId13"/>
+    <p:sldId id="310" r:id="rId14"/>
+    <p:sldId id="311" r:id="rId15"/>
+    <p:sldId id="312" r:id="rId16"/>
+    <p:sldId id="309" r:id="rId17"/>
+    <p:sldId id="313" r:id="rId18"/>
+    <p:sldId id="315" r:id="rId19"/>
+    <p:sldId id="289" r:id="rId20"/>
+    <p:sldId id="279" r:id="rId21"/>
   </p:sldIdLst>
   <p:sldSz cx="12192000" cy="6858000"/>
   <p:notesSz cx="6858000" cy="9144000"/>
@@ -132,11 +135,14 @@
             <p14:sldId id="308"/>
             <p14:sldId id="294"/>
             <p14:sldId id="282"/>
+            <p14:sldId id="314"/>
             <p14:sldId id="305"/>
             <p14:sldId id="310"/>
             <p14:sldId id="311"/>
             <p14:sldId id="312"/>
             <p14:sldId id="309"/>
+            <p14:sldId id="313"/>
+            <p14:sldId id="315"/>
             <p14:sldId id="289"/>
             <p14:sldId id="279"/>
           </p14:sldIdLst>
@@ -238,7 +244,7 @@
           <a:p>
             <a:fld id="{761991DB-DEE8-4174-9435-9D9F721C6C6A}" type="datetimeFigureOut">
               <a:rPr lang="en-US"/>
-              <a:t>9/21/2014</a:t>
+              <a:t>9/25/2014</a:t>
             </a:fld>
             <a:endParaRPr lang="en-US"/>
           </a:p>
@@ -990,7 +996,7 @@
           <a:p>
             <a:fld id="{A7666ED7-631A-46AF-B451-227D0A8685A0}" type="slidenum">
               <a:rPr lang="en-US" smtClean="0"/>
-              <a:t>13</a:t>
+              <a:t>16</a:t>
             </a:fld>
             <a:endParaRPr lang="en-US"/>
           </a:p>
@@ -1210,7 +1216,7 @@
             <a:fld id="{5586B75A-687E-405C-8A0B-8D00578BA2C3}" type="datetimeFigureOut">
               <a:rPr lang="en-US" smtClean="0"/>
               <a:pPr/>
-              <a:t>9/21/2014</a:t>
+              <a:t>9/25/2014</a:t>
             </a:fld>
             <a:endParaRPr lang="en-US" dirty="0"/>
           </a:p>
@@ -1413,7 +1419,7 @@
           <a:p>
             <a:fld id="{5F4E5243-F52A-4D37-9694-EB26C6C31910}" type="datetimeFigureOut">
               <a:rPr lang="en-US" smtClean="0"/>
-              <a:t>9/21/2014</a:t>
+              <a:t>9/25/2014</a:t>
             </a:fld>
             <a:endParaRPr lang="en-US" dirty="0"/>
           </a:p>
@@ -1605,7 +1611,7 @@
           <a:p>
             <a:fld id="{3A77B6E1-634A-48DC-9E8B-D894023267EF}" type="datetimeFigureOut">
               <a:rPr lang="en-US" smtClean="0"/>
-              <a:t>9/21/2014</a:t>
+              <a:t>9/25/2014</a:t>
             </a:fld>
             <a:endParaRPr lang="en-US" dirty="0"/>
           </a:p>
@@ -1787,7 +1793,7 @@
           <a:p>
             <a:fld id="{7B2D3E9E-A95C-48F2-B4BF-A71542E0BE9A}" type="datetimeFigureOut">
               <a:rPr lang="en-US" smtClean="0"/>
-              <a:t>9/21/2014</a:t>
+              <a:t>9/25/2014</a:t>
             </a:fld>
             <a:endParaRPr lang="en-US" dirty="0"/>
           </a:p>
@@ -2056,7 +2062,7 @@
             <a:fld id="{5586B75A-687E-405C-8A0B-8D00578BA2C3}" type="datetimeFigureOut">
               <a:rPr lang="en-US" smtClean="0"/>
               <a:pPr/>
-              <a:t>9/21/2014</a:t>
+              <a:t>9/25/2014</a:t>
             </a:fld>
             <a:endParaRPr lang="en-US" dirty="0"/>
           </a:p>
@@ -2357,7 +2363,7 @@
           <a:p>
             <a:fld id="{F12952B5-7A2F-4CC8-B7CE-9234E21C2837}" type="datetimeFigureOut">
               <a:rPr lang="en-US" smtClean="0"/>
-              <a:t>9/21/2014</a:t>
+              <a:t>9/25/2014</a:t>
             </a:fld>
             <a:endParaRPr lang="en-US" dirty="0"/>
           </a:p>
@@ -2807,7 +2813,7 @@
           <a:p>
             <a:fld id="{CE1DA07A-9201-4B4B-BAF2-015AFA30F520}" type="datetimeFigureOut">
               <a:rPr lang="en-US" smtClean="0"/>
-              <a:t>9/21/2014</a:t>
+              <a:t>9/25/2014</a:t>
             </a:fld>
             <a:endParaRPr lang="en-US" dirty="0"/>
           </a:p>
@@ -2937,7 +2943,7 @@
           <a:p>
             <a:fld id="{73D7E00A-486F-4252-8B1D-E32645521F49}" type="datetimeFigureOut">
               <a:rPr lang="en-US" smtClean="0"/>
-              <a:t>9/21/2014</a:t>
+              <a:t>9/25/2014</a:t>
             </a:fld>
             <a:endParaRPr lang="en-US" dirty="0"/>
           </a:p>
@@ -3044,7 +3050,7 @@
           <a:p>
             <a:fld id="{8DDF5F92-E675-4B36-9A60-69A962A68675}" type="datetimeFigureOut">
               <a:rPr lang="en-US" smtClean="0"/>
-              <a:t>9/21/2014</a:t>
+              <a:t>9/25/2014</a:t>
             </a:fld>
             <a:endParaRPr lang="en-US" dirty="0"/>
           </a:p>
@@ -3412,7 +3418,7 @@
           <a:p>
             <a:fld id="{AF6E2C9B-5FA2-460D-9BE7-B0812FC2A6FF}" type="datetimeFigureOut">
               <a:rPr lang="en-US" smtClean="0"/>
-              <a:t>9/21/2014</a:t>
+              <a:t>9/25/2014</a:t>
             </a:fld>
             <a:endParaRPr lang="en-US" dirty="0"/>
           </a:p>
@@ -3742,7 +3748,7 @@
             <a:fld id="{5586B75A-687E-405C-8A0B-8D00578BA2C3}" type="datetimeFigureOut">
               <a:rPr lang="en-US" smtClean="0"/>
               <a:pPr/>
-              <a:t>9/21/2014</a:t>
+              <a:t>9/25/2014</a:t>
             </a:fld>
             <a:endParaRPr lang="en-US" dirty="0"/>
           </a:p>
@@ -3989,7 +3995,7 @@
             <a:fld id="{5586B75A-687E-405C-8A0B-8D00578BA2C3}" type="datetimeFigureOut">
               <a:rPr lang="en-US" smtClean="0"/>
               <a:pPr/>
-              <a:t>9/21/2014</a:t>
+              <a:t>9/25/2014</a:t>
             </a:fld>
             <a:endParaRPr lang="en-US" dirty="0"/>
           </a:p>
@@ -4549,6 +4555,163 @@
           <a:p>
             <a:r>
               <a:rPr lang="en-CA" dirty="0" smtClean="0"/>
+              <a:t>Association</a:t>
+            </a:r>
+            <a:endParaRPr lang="en-CA" dirty="0"/>
+          </a:p>
+        </p:txBody>
+      </p:sp>
+      <p:pic>
+        <p:nvPicPr>
+          <p:cNvPr id="1026" name="Picture 2" descr="http://upload.wikimedia.org/wikipedia/commons/4/4d/UML_role_example.gif"/>
+          <p:cNvPicPr>
+            <a:picLocks noGrp="1" noChangeAspect="1" noChangeArrowheads="1"/>
+          </p:cNvPicPr>
+          <p:nvPr>
+            <p:ph idx="1"/>
+          </p:nvPr>
+        </p:nvPicPr>
+        <p:blipFill>
+          <a:blip r:embed="rId2">
+            <a:extLst>
+              <a:ext uri="{28A0092B-C50C-407E-A947-70E740481C1C}">
+                <a14:useLocalDpi xmlns:a14="http://schemas.microsoft.com/office/drawing/2010/main" val="0"/>
+              </a:ext>
+            </a:extLst>
+          </a:blip>
+          <a:srcRect/>
+          <a:stretch>
+            <a:fillRect/>
+          </a:stretch>
+        </p:blipFill>
+        <p:spPr bwMode="auto">
+          <a:xfrm>
+            <a:off x="1751038" y="2376136"/>
+            <a:ext cx="9137281" cy="1116572"/>
+          </a:xfrm>
+          <a:prstGeom prst="rect">
+            <a:avLst/>
+          </a:prstGeom>
+          <a:noFill/>
+          <a:extLst>
+            <a:ext uri="{909E8E84-426E-40DD-AFC4-6F175D3DCCD1}">
+              <a14:hiddenFill xmlns:a14="http://schemas.microsoft.com/office/drawing/2010/main">
+                <a:solidFill>
+                  <a:srgbClr val="FFFFFF"/>
+                </a:solidFill>
+              </a14:hiddenFill>
+            </a:ext>
+          </a:extLst>
+        </p:spPr>
+      </p:pic>
+      <p:sp>
+        <p:nvSpPr>
+          <p:cNvPr id="4" name="TextBox 3"/>
+          <p:cNvSpPr txBox="1"/>
+          <p:nvPr/>
+        </p:nvSpPr>
+        <p:spPr>
+          <a:xfrm>
+            <a:off x="3377496" y="3711113"/>
+            <a:ext cx="5332229" cy="369332"/>
+          </a:xfrm>
+          <a:prstGeom prst="rect">
+            <a:avLst/>
+          </a:prstGeom>
+          <a:noFill/>
+        </p:spPr>
+        <p:txBody>
+          <a:bodyPr wrap="none" rtlCol="0">
+            <a:spAutoFit/>
+          </a:bodyPr>
+          <a:lstStyle/>
+          <a:p>
+            <a:r>
+              <a:rPr lang="en-CA" dirty="0"/>
+              <a:t>Taken from </a:t>
+            </a:r>
+            <a:r>
+              <a:rPr lang="en-CA" dirty="0">
+                <a:hlinkClick r:id="rId3"/>
+              </a:rPr>
+              <a:t>http://</a:t>
+            </a:r>
+            <a:r>
+              <a:rPr lang="en-CA" dirty="0" smtClean="0">
+                <a:hlinkClick r:id="rId3"/>
+              </a:rPr>
+              <a:t>en.wikipedia.org/wiki/Class_diagram</a:t>
+            </a:r>
+            <a:r>
+              <a:rPr lang="en-CA" dirty="0" smtClean="0"/>
+              <a:t> </a:t>
+            </a:r>
+            <a:endParaRPr lang="en-CA" dirty="0"/>
+          </a:p>
+        </p:txBody>
+      </p:sp>
+    </p:spTree>
+    <p:extLst>
+      <p:ext uri="{BB962C8B-B14F-4D97-AF65-F5344CB8AC3E}">
+        <p14:creationId xmlns:p14="http://schemas.microsoft.com/office/powerpoint/2010/main" val="1676349451"/>
+      </p:ext>
+    </p:extLst>
+  </p:cSld>
+  <p:clrMapOvr>
+    <a:masterClrMapping/>
+  </p:clrMapOvr>
+  <mc:AlternateContent xmlns:mc="http://schemas.openxmlformats.org/markup-compatibility/2006" xmlns:p14="http://schemas.microsoft.com/office/powerpoint/2010/main">
+    <mc:Choice Requires="p14">
+      <p:transition p14:dur="0"/>
+    </mc:Choice>
+    <mc:Fallback xmlns="">
+      <p:transition/>
+    </mc:Fallback>
+  </mc:AlternateContent>
+  <p:timing>
+    <p:tnLst>
+      <p:par>
+        <p:cTn id="1" dur="indefinite" restart="never" nodeType="tmRoot"/>
+      </p:par>
+    </p:tnLst>
+  </p:timing>
+</p:sld>
+</file>
+
+<file path=ppt/slides/slide11.xml><?xml version="1.0" encoding="utf-8"?>
+<p:sld xmlns:a="http://schemas.openxmlformats.org/drawingml/2006/main" xmlns:r="http://schemas.openxmlformats.org/officeDocument/2006/relationships" xmlns:p="http://schemas.openxmlformats.org/presentationml/2006/main">
+  <p:cSld>
+    <p:spTree>
+      <p:nvGrpSpPr>
+        <p:cNvPr id="1" name=""/>
+        <p:cNvGrpSpPr/>
+        <p:nvPr/>
+      </p:nvGrpSpPr>
+      <p:grpSpPr>
+        <a:xfrm>
+          <a:off x="0" y="0"/>
+          <a:ext cx="0" cy="0"/>
+          <a:chOff x="0" y="0"/>
+          <a:chExt cx="0" cy="0"/>
+        </a:xfrm>
+      </p:grpSpPr>
+      <p:sp>
+        <p:nvSpPr>
+          <p:cNvPr id="2" name="Title 1"/>
+          <p:cNvSpPr>
+            <a:spLocks noGrp="1"/>
+          </p:cNvSpPr>
+          <p:nvPr>
+            <p:ph type="title"/>
+          </p:nvPr>
+        </p:nvSpPr>
+        <p:spPr/>
+        <p:txBody>
+          <a:bodyPr/>
+          <a:lstStyle/>
+          <a:p>
+            <a:r>
+              <a:rPr lang="en-CA" dirty="0" smtClean="0"/>
               <a:t>Aggregation</a:t>
             </a:r>
             <a:endParaRPr lang="en-CA" dirty="0"/>
@@ -4684,144 +4847,11 @@
   <p:clrMapOvr>
     <a:masterClrMapping/>
   </p:clrMapOvr>
-  <mc:AlternateContent xmlns:mc="http://schemas.openxmlformats.org/markup-compatibility/2006">
-    <mc:Choice xmlns:p14="http://schemas.microsoft.com/office/powerpoint/2010/main" Requires="p14">
+  <mc:AlternateContent xmlns:mc="http://schemas.openxmlformats.org/markup-compatibility/2006" xmlns:p14="http://schemas.microsoft.com/office/powerpoint/2010/main">
+    <mc:Choice Requires="p14">
       <p:transition p14:dur="0"/>
     </mc:Choice>
-    <mc:Fallback>
-      <p:transition/>
-    </mc:Fallback>
-  </mc:AlternateContent>
-</p:sld>
-</file>
-
-<file path=ppt/slides/slide11.xml><?xml version="1.0" encoding="utf-8"?>
-<p:sld xmlns:a="http://schemas.openxmlformats.org/drawingml/2006/main" xmlns:r="http://schemas.openxmlformats.org/officeDocument/2006/relationships" xmlns:p="http://schemas.openxmlformats.org/presentationml/2006/main">
-  <p:cSld>
-    <p:spTree>
-      <p:nvGrpSpPr>
-        <p:cNvPr id="1" name=""/>
-        <p:cNvGrpSpPr/>
-        <p:nvPr/>
-      </p:nvGrpSpPr>
-      <p:grpSpPr>
-        <a:xfrm>
-          <a:off x="0" y="0"/>
-          <a:ext cx="0" cy="0"/>
-          <a:chOff x="0" y="0"/>
-          <a:chExt cx="0" cy="0"/>
-        </a:xfrm>
-      </p:grpSpPr>
-      <p:sp>
-        <p:nvSpPr>
-          <p:cNvPr id="2" name="Title 1"/>
-          <p:cNvSpPr>
-            <a:spLocks noGrp="1"/>
-          </p:cNvSpPr>
-          <p:nvPr>
-            <p:ph type="title"/>
-          </p:nvPr>
-        </p:nvSpPr>
-        <p:spPr/>
-        <p:txBody>
-          <a:bodyPr/>
-          <a:lstStyle/>
-          <a:p>
-            <a:r>
-              <a:rPr lang="en-CA" dirty="0" smtClean="0"/>
-              <a:t>Composition	</a:t>
-            </a:r>
-            <a:endParaRPr lang="en-CA" dirty="0"/>
-          </a:p>
-        </p:txBody>
-      </p:sp>
-      <p:pic>
-        <p:nvPicPr>
-          <p:cNvPr id="4" name="Content Placeholder 3"/>
-          <p:cNvPicPr>
-            <a:picLocks noGrp="1" noChangeAspect="1"/>
-          </p:cNvPicPr>
-          <p:nvPr>
-            <p:ph idx="1"/>
-          </p:nvPr>
-        </p:nvPicPr>
-        <p:blipFill>
-          <a:blip r:embed="rId2"/>
-          <a:stretch>
-            <a:fillRect/>
-          </a:stretch>
-        </p:blipFill>
-        <p:spPr>
-          <a:xfrm>
-            <a:off x="2378762" y="2621938"/>
-            <a:ext cx="7329697" cy="1230533"/>
-          </a:xfrm>
-          <a:prstGeom prst="rect">
-            <a:avLst/>
-          </a:prstGeom>
-        </p:spPr>
-      </p:pic>
-      <p:sp>
-        <p:nvSpPr>
-          <p:cNvPr id="5" name="TextBox 4"/>
-          <p:cNvSpPr txBox="1"/>
-          <p:nvPr/>
-        </p:nvSpPr>
-        <p:spPr>
-          <a:xfrm>
-            <a:off x="3087974" y="4037288"/>
-            <a:ext cx="5332229" cy="369332"/>
-          </a:xfrm>
-          <a:prstGeom prst="rect">
-            <a:avLst/>
-          </a:prstGeom>
-          <a:noFill/>
-        </p:spPr>
-        <p:txBody>
-          <a:bodyPr wrap="none" rtlCol="0">
-            <a:spAutoFit/>
-          </a:bodyPr>
-          <a:lstStyle/>
-          <a:p>
-            <a:r>
-              <a:rPr lang="en-CA" dirty="0"/>
-              <a:t>Taken from </a:t>
-            </a:r>
-            <a:r>
-              <a:rPr lang="en-CA" dirty="0">
-                <a:hlinkClick r:id="rId3"/>
-              </a:rPr>
-              <a:t>http://</a:t>
-            </a:r>
-            <a:r>
-              <a:rPr lang="en-CA" dirty="0" smtClean="0">
-                <a:hlinkClick r:id="rId3"/>
-              </a:rPr>
-              <a:t>en.wikipedia.org/wiki/Class_diagram</a:t>
-            </a:r>
-            <a:r>
-              <a:rPr lang="en-CA" dirty="0" smtClean="0"/>
-              <a:t> </a:t>
-            </a:r>
-            <a:endParaRPr lang="en-CA" dirty="0"/>
-          </a:p>
-        </p:txBody>
-      </p:sp>
-    </p:spTree>
-    <p:extLst>
-      <p:ext uri="{BB962C8B-B14F-4D97-AF65-F5344CB8AC3E}">
-        <p14:creationId xmlns:p14="http://schemas.microsoft.com/office/powerpoint/2010/main" val="1508495690"/>
-      </p:ext>
-    </p:extLst>
-  </p:cSld>
-  <p:clrMapOvr>
-    <a:masterClrMapping/>
-  </p:clrMapOvr>
-  <mc:AlternateContent xmlns:mc="http://schemas.openxmlformats.org/markup-compatibility/2006">
-    <mc:Choice xmlns:p14="http://schemas.microsoft.com/office/powerpoint/2010/main" Requires="p14">
-      <p:transition p14:dur="0"/>
-    </mc:Choice>
-    <mc:Fallback>
+    <mc:Fallback xmlns="">
       <p:transition/>
     </mc:Fallback>
   </mc:AlternateContent>
@@ -4862,7 +4892,7 @@
           <a:p>
             <a:r>
               <a:rPr lang="en-CA" dirty="0" smtClean="0"/>
-              <a:t>Multiplicity</a:t>
+              <a:t>Composition	</a:t>
             </a:r>
             <a:endParaRPr lang="en-CA" dirty="0"/>
           </a:p>
@@ -4886,8 +4916,8 @@
         </p:blipFill>
         <p:spPr>
           <a:xfrm>
-            <a:off x="2228848" y="2334161"/>
-            <a:ext cx="7629525" cy="3228975"/>
+            <a:off x="2378762" y="2621938"/>
+            <a:ext cx="7329697" cy="1230533"/>
           </a:xfrm>
           <a:prstGeom prst="rect">
             <a:avLst/>
@@ -4902,8 +4932,8 @@
         </p:nvSpPr>
         <p:spPr>
           <a:xfrm>
-            <a:off x="1306769" y="5739566"/>
-            <a:ext cx="9473684" cy="369332"/>
+            <a:off x="3087974" y="4037288"/>
+            <a:ext cx="5332229" cy="369332"/>
           </a:xfrm>
           <a:prstGeom prst="rect">
             <a:avLst/>
@@ -4924,13 +4954,13 @@
               <a:rPr lang="en-CA" dirty="0">
                 <a:hlinkClick r:id="rId3"/>
               </a:rPr>
-              <a:t>http://www.ibm.com/developerworks/rational/library/content/RationalEdge/sep04/bell</a:t>
+              <a:t>http://</a:t>
             </a:r>
             <a:r>
               <a:rPr lang="en-CA" dirty="0" smtClean="0">
                 <a:hlinkClick r:id="rId3"/>
               </a:rPr>
-              <a:t>/</a:t>
+              <a:t>en.wikipedia.org/wiki/Class_diagram</a:t>
             </a:r>
             <a:r>
               <a:rPr lang="en-CA" dirty="0" smtClean="0"/>
@@ -4943,28 +4973,21 @@
     </p:spTree>
     <p:extLst>
       <p:ext uri="{BB962C8B-B14F-4D97-AF65-F5344CB8AC3E}">
-        <p14:creationId xmlns:p14="http://schemas.microsoft.com/office/powerpoint/2010/main" val="3030717885"/>
+        <p14:creationId xmlns:p14="http://schemas.microsoft.com/office/powerpoint/2010/main" val="1508495690"/>
       </p:ext>
     </p:extLst>
   </p:cSld>
   <p:clrMapOvr>
     <a:masterClrMapping/>
   </p:clrMapOvr>
-  <mc:AlternateContent xmlns:mc="http://schemas.openxmlformats.org/markup-compatibility/2006">
-    <mc:Choice xmlns:p14="http://schemas.microsoft.com/office/powerpoint/2010/main" Requires="p14">
+  <mc:AlternateContent xmlns:mc="http://schemas.openxmlformats.org/markup-compatibility/2006" xmlns:p14="http://schemas.microsoft.com/office/powerpoint/2010/main">
+    <mc:Choice Requires="p14">
       <p:transition p14:dur="0"/>
     </mc:Choice>
-    <mc:Fallback>
+    <mc:Fallback xmlns="">
       <p:transition/>
     </mc:Fallback>
   </mc:AlternateContent>
-  <p:timing>
-    <p:tnLst>
-      <p:par>
-        <p:cTn id="1" dur="indefinite" restart="never" nodeType="tmRoot"/>
-      </p:par>
-    </p:tnLst>
-  </p:timing>
 </p:sld>
 </file>
 
@@ -5002,6 +5025,359 @@
           <a:p>
             <a:r>
               <a:rPr lang="en-CA" dirty="0" smtClean="0"/>
+              <a:t>Multiplicity</a:t>
+            </a:r>
+            <a:endParaRPr lang="en-CA" dirty="0"/>
+          </a:p>
+        </p:txBody>
+      </p:sp>
+      <p:pic>
+        <p:nvPicPr>
+          <p:cNvPr id="4" name="Content Placeholder 3"/>
+          <p:cNvPicPr>
+            <a:picLocks noGrp="1" noChangeAspect="1"/>
+          </p:cNvPicPr>
+          <p:nvPr>
+            <p:ph idx="1"/>
+          </p:nvPr>
+        </p:nvPicPr>
+        <p:blipFill>
+          <a:blip r:embed="rId2"/>
+          <a:stretch>
+            <a:fillRect/>
+          </a:stretch>
+        </p:blipFill>
+        <p:spPr>
+          <a:xfrm>
+            <a:off x="2228848" y="2334161"/>
+            <a:ext cx="7629525" cy="3228975"/>
+          </a:xfrm>
+          <a:prstGeom prst="rect">
+            <a:avLst/>
+          </a:prstGeom>
+        </p:spPr>
+      </p:pic>
+      <p:sp>
+        <p:nvSpPr>
+          <p:cNvPr id="5" name="TextBox 4"/>
+          <p:cNvSpPr txBox="1"/>
+          <p:nvPr/>
+        </p:nvSpPr>
+        <p:spPr>
+          <a:xfrm>
+            <a:off x="1306769" y="5739566"/>
+            <a:ext cx="9473684" cy="369332"/>
+          </a:xfrm>
+          <a:prstGeom prst="rect">
+            <a:avLst/>
+          </a:prstGeom>
+          <a:noFill/>
+        </p:spPr>
+        <p:txBody>
+          <a:bodyPr wrap="none" rtlCol="0">
+            <a:spAutoFit/>
+          </a:bodyPr>
+          <a:lstStyle/>
+          <a:p>
+            <a:r>
+              <a:rPr lang="en-CA" dirty="0"/>
+              <a:t>Taken from </a:t>
+            </a:r>
+            <a:r>
+              <a:rPr lang="en-CA" dirty="0">
+                <a:hlinkClick r:id="rId3"/>
+              </a:rPr>
+              <a:t>http://www.ibm.com/developerworks/rational/library/content/RationalEdge/sep04/bell</a:t>
+            </a:r>
+            <a:r>
+              <a:rPr lang="en-CA" dirty="0" smtClean="0">
+                <a:hlinkClick r:id="rId3"/>
+              </a:rPr>
+              <a:t>/</a:t>
+            </a:r>
+            <a:r>
+              <a:rPr lang="en-CA" dirty="0" smtClean="0"/>
+              <a:t> </a:t>
+            </a:r>
+            <a:endParaRPr lang="en-CA" dirty="0"/>
+          </a:p>
+        </p:txBody>
+      </p:sp>
+    </p:spTree>
+    <p:extLst>
+      <p:ext uri="{BB962C8B-B14F-4D97-AF65-F5344CB8AC3E}">
+        <p14:creationId xmlns:p14="http://schemas.microsoft.com/office/powerpoint/2010/main" val="3030717885"/>
+      </p:ext>
+    </p:extLst>
+  </p:cSld>
+  <p:clrMapOvr>
+    <a:masterClrMapping/>
+  </p:clrMapOvr>
+  <mc:AlternateContent xmlns:mc="http://schemas.openxmlformats.org/markup-compatibility/2006" xmlns:p14="http://schemas.microsoft.com/office/powerpoint/2010/main">
+    <mc:Choice Requires="p14">
+      <p:transition p14:dur="0"/>
+    </mc:Choice>
+    <mc:Fallback xmlns="">
+      <p:transition/>
+    </mc:Fallback>
+  </mc:AlternateContent>
+  <p:timing>
+    <p:tnLst>
+      <p:par>
+        <p:cTn id="1" dur="indefinite" restart="never" nodeType="tmRoot"/>
+      </p:par>
+    </p:tnLst>
+  </p:timing>
+</p:sld>
+</file>
+
+<file path=ppt/slides/slide14.xml><?xml version="1.0" encoding="utf-8"?>
+<p:sld xmlns:a="http://schemas.openxmlformats.org/drawingml/2006/main" xmlns:r="http://schemas.openxmlformats.org/officeDocument/2006/relationships" xmlns:p="http://schemas.openxmlformats.org/presentationml/2006/main">
+  <p:cSld>
+    <p:spTree>
+      <p:nvGrpSpPr>
+        <p:cNvPr id="1" name=""/>
+        <p:cNvGrpSpPr/>
+        <p:nvPr/>
+      </p:nvGrpSpPr>
+      <p:grpSpPr>
+        <a:xfrm>
+          <a:off x="0" y="0"/>
+          <a:ext cx="0" cy="0"/>
+          <a:chOff x="0" y="0"/>
+          <a:chExt cx="0" cy="0"/>
+        </a:xfrm>
+      </p:grpSpPr>
+      <p:sp>
+        <p:nvSpPr>
+          <p:cNvPr id="2" name="Title 1"/>
+          <p:cNvSpPr>
+            <a:spLocks noGrp="1"/>
+          </p:cNvSpPr>
+          <p:nvPr>
+            <p:ph type="title"/>
+          </p:nvPr>
+        </p:nvSpPr>
+        <p:spPr/>
+        <p:txBody>
+          <a:bodyPr/>
+          <a:lstStyle/>
+          <a:p>
+            <a:r>
+              <a:rPr lang="en-CA" dirty="0" smtClean="0"/>
+              <a:t>Inheritance</a:t>
+            </a:r>
+            <a:endParaRPr lang="en-CA" dirty="0"/>
+          </a:p>
+        </p:txBody>
+      </p:sp>
+      <p:pic>
+        <p:nvPicPr>
+          <p:cNvPr id="6" name="Content Placeholder 5"/>
+          <p:cNvPicPr>
+            <a:picLocks noGrp="1" noChangeAspect="1"/>
+          </p:cNvPicPr>
+          <p:nvPr>
+            <p:ph idx="1"/>
+          </p:nvPr>
+        </p:nvPicPr>
+        <p:blipFill>
+          <a:blip r:embed="rId2"/>
+          <a:stretch>
+            <a:fillRect/>
+          </a:stretch>
+        </p:blipFill>
+        <p:spPr>
+          <a:xfrm>
+            <a:off x="2675762" y="2157731"/>
+            <a:ext cx="6735698" cy="4202490"/>
+          </a:xfrm>
+          <a:prstGeom prst="rect">
+            <a:avLst/>
+          </a:prstGeom>
+        </p:spPr>
+      </p:pic>
+    </p:spTree>
+    <p:extLst>
+      <p:ext uri="{BB962C8B-B14F-4D97-AF65-F5344CB8AC3E}">
+        <p14:creationId xmlns:p14="http://schemas.microsoft.com/office/powerpoint/2010/main" val="133953578"/>
+      </p:ext>
+    </p:extLst>
+  </p:cSld>
+  <p:clrMapOvr>
+    <a:masterClrMapping/>
+  </p:clrMapOvr>
+  <mc:AlternateContent xmlns:mc="http://schemas.openxmlformats.org/markup-compatibility/2006">
+    <mc:Choice xmlns:p14="http://schemas.microsoft.com/office/powerpoint/2010/main" Requires="p14">
+      <p:transition p14:dur="0"/>
+    </mc:Choice>
+    <mc:Fallback>
+      <p:transition/>
+    </mc:Fallback>
+  </mc:AlternateContent>
+</p:sld>
+</file>
+
+<file path=ppt/slides/slide15.xml><?xml version="1.0" encoding="utf-8"?>
+<p:sld xmlns:a="http://schemas.openxmlformats.org/drawingml/2006/main" xmlns:r="http://schemas.openxmlformats.org/officeDocument/2006/relationships" xmlns:p="http://schemas.openxmlformats.org/presentationml/2006/main">
+  <p:cSld>
+    <p:spTree>
+      <p:nvGrpSpPr>
+        <p:cNvPr id="1" name=""/>
+        <p:cNvGrpSpPr/>
+        <p:nvPr/>
+      </p:nvGrpSpPr>
+      <p:grpSpPr>
+        <a:xfrm>
+          <a:off x="0" y="0"/>
+          <a:ext cx="0" cy="0"/>
+          <a:chOff x="0" y="0"/>
+          <a:chExt cx="0" cy="0"/>
+        </a:xfrm>
+      </p:grpSpPr>
+      <p:sp>
+        <p:nvSpPr>
+          <p:cNvPr id="2" name="Title 1"/>
+          <p:cNvSpPr>
+            <a:spLocks noGrp="1"/>
+          </p:cNvSpPr>
+          <p:nvPr>
+            <p:ph type="title"/>
+          </p:nvPr>
+        </p:nvSpPr>
+        <p:spPr/>
+        <p:txBody>
+          <a:bodyPr/>
+          <a:lstStyle/>
+          <a:p>
+            <a:r>
+              <a:rPr lang="en-CA" dirty="0" smtClean="0"/>
+              <a:t>Interfaces</a:t>
+            </a:r>
+            <a:endParaRPr lang="en-CA" dirty="0"/>
+          </a:p>
+        </p:txBody>
+      </p:sp>
+      <p:pic>
+        <p:nvPicPr>
+          <p:cNvPr id="4" name="Content Placeholder 3"/>
+          <p:cNvPicPr>
+            <a:picLocks noGrp="1" noChangeAspect="1"/>
+          </p:cNvPicPr>
+          <p:nvPr>
+            <p:ph idx="1"/>
+          </p:nvPr>
+        </p:nvPicPr>
+        <p:blipFill>
+          <a:blip r:embed="rId2"/>
+          <a:stretch>
+            <a:fillRect/>
+          </a:stretch>
+        </p:blipFill>
+        <p:spPr>
+          <a:xfrm>
+            <a:off x="657224" y="2157731"/>
+            <a:ext cx="7507787" cy="3652070"/>
+          </a:xfrm>
+          <a:prstGeom prst="rect">
+            <a:avLst/>
+          </a:prstGeom>
+        </p:spPr>
+      </p:pic>
+      <p:sp>
+        <p:nvSpPr>
+          <p:cNvPr id="5" name="TextBox 4"/>
+          <p:cNvSpPr txBox="1"/>
+          <p:nvPr/>
+        </p:nvSpPr>
+        <p:spPr>
+          <a:xfrm>
+            <a:off x="8080737" y="2495679"/>
+            <a:ext cx="1295676" cy="1200329"/>
+          </a:xfrm>
+          <a:prstGeom prst="rect">
+            <a:avLst/>
+          </a:prstGeom>
+          <a:noFill/>
+        </p:spPr>
+        <p:txBody>
+          <a:bodyPr wrap="none" rtlCol="0">
+            <a:spAutoFit/>
+          </a:bodyPr>
+          <a:lstStyle/>
+          <a:p>
+            <a:r>
+              <a:rPr lang="en-CA" sz="2400" dirty="0" smtClean="0"/>
+              <a:t>Name</a:t>
+            </a:r>
+          </a:p>
+          <a:p>
+            <a:endParaRPr lang="en-CA" sz="2400" dirty="0" smtClean="0"/>
+          </a:p>
+          <a:p>
+            <a:r>
+              <a:rPr lang="en-CA" sz="2400" dirty="0" smtClean="0"/>
+              <a:t>Methods</a:t>
+            </a:r>
+            <a:endParaRPr lang="en-CA" sz="2400" dirty="0"/>
+          </a:p>
+        </p:txBody>
+      </p:sp>
+    </p:spTree>
+    <p:extLst>
+      <p:ext uri="{BB962C8B-B14F-4D97-AF65-F5344CB8AC3E}">
+        <p14:creationId xmlns:p14="http://schemas.microsoft.com/office/powerpoint/2010/main" val="2443441875"/>
+      </p:ext>
+    </p:extLst>
+  </p:cSld>
+  <p:clrMapOvr>
+    <a:masterClrMapping/>
+  </p:clrMapOvr>
+  <mc:AlternateContent xmlns:mc="http://schemas.openxmlformats.org/markup-compatibility/2006">
+    <mc:Choice xmlns:p14="http://schemas.microsoft.com/office/powerpoint/2010/main" Requires="p14">
+      <p:transition p14:dur="0"/>
+    </mc:Choice>
+    <mc:Fallback>
+      <p:transition/>
+    </mc:Fallback>
+  </mc:AlternateContent>
+</p:sld>
+</file>
+
+<file path=ppt/slides/slide16.xml><?xml version="1.0" encoding="utf-8"?>
+<p:sld xmlns:a="http://schemas.openxmlformats.org/drawingml/2006/main" xmlns:r="http://schemas.openxmlformats.org/officeDocument/2006/relationships" xmlns:p="http://schemas.openxmlformats.org/presentationml/2006/main">
+  <p:cSld>
+    <p:spTree>
+      <p:nvGrpSpPr>
+        <p:cNvPr id="1" name=""/>
+        <p:cNvGrpSpPr/>
+        <p:nvPr/>
+      </p:nvGrpSpPr>
+      <p:grpSpPr>
+        <a:xfrm>
+          <a:off x="0" y="0"/>
+          <a:ext cx="0" cy="0"/>
+          <a:chOff x="0" y="0"/>
+          <a:chExt cx="0" cy="0"/>
+        </a:xfrm>
+      </p:grpSpPr>
+      <p:sp>
+        <p:nvSpPr>
+          <p:cNvPr id="2" name="Title 1"/>
+          <p:cNvSpPr>
+            <a:spLocks noGrp="1"/>
+          </p:cNvSpPr>
+          <p:nvPr>
+            <p:ph type="title"/>
+          </p:nvPr>
+        </p:nvSpPr>
+        <p:spPr/>
+        <p:txBody>
+          <a:bodyPr/>
+          <a:lstStyle/>
+          <a:p>
+            <a:r>
+              <a:rPr lang="en-CA" dirty="0" smtClean="0"/>
               <a:t>Exercise</a:t>
             </a:r>
             <a:endParaRPr lang="en-CA" dirty="0"/>
@@ -5069,10 +5445,6 @@
               <a:rPr lang="en-CA" dirty="0"/>
               <a:t>more entertainers.</a:t>
             </a:r>
-            <a:r>
-              <a:rPr lang="en-CA" dirty="0"/>
-              <a:t/>
-            </a:r>
             <a:br>
               <a:rPr lang="en-CA" dirty="0"/>
             </a:br>
@@ -5131,7 +5503,6 @@
               <a:rPr lang="en-CA" dirty="0"/>
               <a:t>library maintains their name, address and phone number. </a:t>
             </a:r>
-            <a:endParaRPr lang="en-CA" dirty="0"/>
           </a:p>
         </p:txBody>
       </p:sp>
@@ -5163,7 +5534,7 @@
 </p:sld>
 </file>
 
-<file path=ppt/slides/slide14.xml><?xml version="1.0" encoding="utf-8"?>
+<file path=ppt/slides/slide17.xml><?xml version="1.0" encoding="utf-8"?>
 <p:sld xmlns:a="http://schemas.openxmlformats.org/drawingml/2006/main" xmlns:r="http://schemas.openxmlformats.org/officeDocument/2006/relationships" xmlns:p="http://schemas.openxmlformats.org/presentationml/2006/main">
   <p:cSld>
     <p:spTree>
@@ -5545,7 +5916,11 @@
             </a:pPr>
             <a:r>
               <a:rPr lang="en-CA" b="1" dirty="0" smtClean="0"/>
-              <a:t>Extend: When one action can be replaced by another</a:t>
+              <a:t>Extend: When one action can be replaced by </a:t>
+            </a:r>
+            <a:r>
+              <a:rPr lang="en-CA" b="1" dirty="0" smtClean="0"/>
+              <a:t>another (inheritance)</a:t>
             </a:r>
             <a:endParaRPr lang="en-US" b="1" dirty="0"/>
           </a:p>
@@ -5892,11 +6267,11 @@
   <p:clrMapOvr>
     <a:masterClrMapping/>
   </p:clrMapOvr>
-  <mc:AlternateContent xmlns:mc="http://schemas.openxmlformats.org/markup-compatibility/2006">
-    <mc:Choice xmlns:p14="http://schemas.microsoft.com/office/powerpoint/2010/main" Requires="p14">
+  <mc:AlternateContent xmlns:mc="http://schemas.openxmlformats.org/markup-compatibility/2006" xmlns:p14="http://schemas.microsoft.com/office/powerpoint/2010/main">
+    <mc:Choice Requires="p14">
       <p:transition p14:dur="0"/>
     </mc:Choice>
-    <mc:Fallback>
+    <mc:Fallback xmlns="">
       <p:transition/>
     </mc:Fallback>
   </mc:AlternateContent>
@@ -6064,7 +6439,7 @@
           <a:p>
             <a:r>
               <a:rPr lang="en-CA" dirty="0" smtClean="0"/>
-              <a:t>Functional Requirements</a:t>
+              <a:t>Class Diagrams</a:t>
             </a:r>
             <a:endParaRPr lang="en-CA" dirty="0"/>
           </a:p>
@@ -6206,77 +6581,60 @@
           <a:p>
             <a:r>
               <a:rPr lang="en-CA" dirty="0" smtClean="0"/>
-              <a:t>Relationships</a:t>
+              <a:t>Class Diagrams in </a:t>
+            </a:r>
+            <a:r>
+              <a:rPr lang="en-CA" dirty="0" err="1" smtClean="0"/>
+              <a:t>ArgoUml</a:t>
             </a:r>
             <a:endParaRPr lang="en-CA" dirty="0"/>
           </a:p>
         </p:txBody>
       </p:sp>
-      <p:sp>
-        <p:nvSpPr>
-          <p:cNvPr id="3" name="Content Placeholder 2"/>
-          <p:cNvSpPr>
-            <a:spLocks noGrp="1"/>
-          </p:cNvSpPr>
+      <p:pic>
+        <p:nvPicPr>
+          <p:cNvPr id="9" name="Content Placeholder 8"/>
+          <p:cNvPicPr>
+            <a:picLocks noGrp="1" noChangeAspect="1"/>
+          </p:cNvPicPr>
           <p:nvPr>
             <p:ph idx="1"/>
           </p:nvPr>
-        </p:nvSpPr>
+        </p:nvPicPr>
+        <p:blipFill>
+          <a:blip r:embed="rId2"/>
+          <a:stretch>
+            <a:fillRect/>
+          </a:stretch>
+        </p:blipFill>
         <p:spPr>
           <a:xfrm>
-            <a:off x="676274" y="2157731"/>
-            <a:ext cx="10753725" cy="3766185"/>
+            <a:off x="1198353" y="2157731"/>
+            <a:ext cx="8923740" cy="2538972"/>
           </a:xfrm>
+          <a:prstGeom prst="rect">
+            <a:avLst/>
+          </a:prstGeom>
         </p:spPr>
-        <p:txBody>
-          <a:bodyPr/>
-          <a:lstStyle/>
-          <a:p>
-            <a:pPr lvl="1"/>
-            <a:r>
-              <a:rPr lang="en-CA" dirty="0" smtClean="0"/>
-              <a:t>Has A (Association, Aggregation, Composition)</a:t>
-            </a:r>
-          </a:p>
-          <a:p>
-            <a:pPr lvl="1"/>
-            <a:endParaRPr lang="en-CA" dirty="0"/>
-          </a:p>
-          <a:p>
-            <a:pPr lvl="1"/>
-            <a:r>
-              <a:rPr lang="en-CA" dirty="0" smtClean="0"/>
-              <a:t>Is A (inheritance)</a:t>
-            </a:r>
-            <a:endParaRPr lang="en-CA" dirty="0" smtClean="0"/>
-          </a:p>
-        </p:txBody>
-      </p:sp>
+      </p:pic>
     </p:spTree>
     <p:extLst>
       <p:ext uri="{BB962C8B-B14F-4D97-AF65-F5344CB8AC3E}">
-        <p14:creationId xmlns:p14="http://schemas.microsoft.com/office/powerpoint/2010/main" val="330413581"/>
+        <p14:creationId xmlns:p14="http://schemas.microsoft.com/office/powerpoint/2010/main" val="2705939334"/>
       </p:ext>
     </p:extLst>
   </p:cSld>
   <p:clrMapOvr>
     <a:masterClrMapping/>
   </p:clrMapOvr>
-  <mc:AlternateContent xmlns:mc="http://schemas.openxmlformats.org/markup-compatibility/2006" xmlns:p14="http://schemas.microsoft.com/office/powerpoint/2010/main">
-    <mc:Choice Requires="p14">
+  <mc:AlternateContent xmlns:mc="http://schemas.openxmlformats.org/markup-compatibility/2006">
+    <mc:Choice xmlns:p14="http://schemas.microsoft.com/office/powerpoint/2010/main" Requires="p14">
       <p:transition p14:dur="0"/>
     </mc:Choice>
-    <mc:Fallback xmlns="">
+    <mc:Fallback>
       <p:transition/>
     </mc:Fallback>
   </mc:AlternateContent>
-  <p:timing>
-    <p:tnLst>
-      <p:par>
-        <p:cTn id="1" dur="indefinite" restart="never" nodeType="tmRoot"/>
-      </p:par>
-    </p:tnLst>
-  </p:timing>
 </p:sld>
 </file>
 
@@ -6314,116 +6672,66 @@
           <a:p>
             <a:r>
               <a:rPr lang="en-CA" dirty="0" smtClean="0"/>
-              <a:t>Association</a:t>
+              <a:t>Relationships</a:t>
             </a:r>
             <a:endParaRPr lang="en-CA" dirty="0"/>
           </a:p>
         </p:txBody>
       </p:sp>
-      <p:pic>
-        <p:nvPicPr>
-          <p:cNvPr id="1026" name="Picture 2" descr="http://upload.wikimedia.org/wikipedia/commons/4/4d/UML_role_example.gif"/>
-          <p:cNvPicPr>
-            <a:picLocks noGrp="1" noChangeAspect="1" noChangeArrowheads="1"/>
-          </p:cNvPicPr>
+      <p:sp>
+        <p:nvSpPr>
+          <p:cNvPr id="3" name="Content Placeholder 2"/>
+          <p:cNvSpPr>
+            <a:spLocks noGrp="1"/>
+          </p:cNvSpPr>
           <p:nvPr>
             <p:ph idx="1"/>
           </p:nvPr>
-        </p:nvPicPr>
-        <p:blipFill>
-          <a:blip r:embed="rId2">
-            <a:extLst>
-              <a:ext uri="{28A0092B-C50C-407E-A947-70E740481C1C}">
-                <a14:useLocalDpi xmlns:a14="http://schemas.microsoft.com/office/drawing/2010/main" val="0"/>
-              </a:ext>
-            </a:extLst>
-          </a:blip>
-          <a:srcRect/>
-          <a:stretch>
-            <a:fillRect/>
-          </a:stretch>
-        </p:blipFill>
-        <p:spPr bwMode="auto">
-          <a:xfrm>
-            <a:off x="1751038" y="2376136"/>
-            <a:ext cx="9137281" cy="1116572"/>
-          </a:xfrm>
-          <a:prstGeom prst="rect">
-            <a:avLst/>
-          </a:prstGeom>
-          <a:noFill/>
-          <a:extLst>
-            <a:ext uri="{909E8E84-426E-40DD-AFC4-6F175D3DCCD1}">
-              <a14:hiddenFill xmlns:a14="http://schemas.microsoft.com/office/drawing/2010/main">
-                <a:solidFill>
-                  <a:srgbClr val="FFFFFF"/>
-                </a:solidFill>
-              </a14:hiddenFill>
-            </a:ext>
-          </a:extLst>
-        </p:spPr>
-      </p:pic>
-      <p:sp>
-        <p:nvSpPr>
-          <p:cNvPr id="4" name="TextBox 3"/>
-          <p:cNvSpPr txBox="1"/>
-          <p:nvPr/>
         </p:nvSpPr>
         <p:spPr>
           <a:xfrm>
-            <a:off x="3377496" y="3711113"/>
-            <a:ext cx="5332229" cy="369332"/>
+            <a:off x="676274" y="2157731"/>
+            <a:ext cx="10753725" cy="3766185"/>
           </a:xfrm>
-          <a:prstGeom prst="rect">
-            <a:avLst/>
-          </a:prstGeom>
-          <a:noFill/>
         </p:spPr>
         <p:txBody>
-          <a:bodyPr wrap="none" rtlCol="0">
-            <a:spAutoFit/>
-          </a:bodyPr>
-          <a:lstStyle/>
-          <a:p>
-            <a:r>
-              <a:rPr lang="en-CA" dirty="0"/>
-              <a:t>Taken from </a:t>
-            </a:r>
-            <a:r>
-              <a:rPr lang="en-CA" dirty="0">
-                <a:hlinkClick r:id="rId3"/>
-              </a:rPr>
-              <a:t>http://</a:t>
-            </a:r>
-            <a:r>
-              <a:rPr lang="en-CA" dirty="0" smtClean="0">
-                <a:hlinkClick r:id="rId3"/>
-              </a:rPr>
-              <a:t>en.wikipedia.org/wiki/Class_diagram</a:t>
-            </a:r>
+          <a:bodyPr/>
+          <a:lstStyle/>
+          <a:p>
+            <a:pPr lvl="1"/>
             <a:r>
               <a:rPr lang="en-CA" dirty="0" smtClean="0"/>
-              <a:t> </a:t>
-            </a:r>
+              <a:t>Has A (Association, Aggregation, Composition)</a:t>
+            </a:r>
+          </a:p>
+          <a:p>
+            <a:pPr lvl="1"/>
             <a:endParaRPr lang="en-CA" dirty="0"/>
+          </a:p>
+          <a:p>
+            <a:pPr lvl="1"/>
+            <a:r>
+              <a:rPr lang="en-CA" dirty="0" smtClean="0"/>
+              <a:t>Is A (inheritance)</a:t>
+            </a:r>
           </a:p>
         </p:txBody>
       </p:sp>
     </p:spTree>
     <p:extLst>
       <p:ext uri="{BB962C8B-B14F-4D97-AF65-F5344CB8AC3E}">
-        <p14:creationId xmlns:p14="http://schemas.microsoft.com/office/powerpoint/2010/main" val="1676349451"/>
+        <p14:creationId xmlns:p14="http://schemas.microsoft.com/office/powerpoint/2010/main" val="330413581"/>
       </p:ext>
     </p:extLst>
   </p:cSld>
   <p:clrMapOvr>
     <a:masterClrMapping/>
   </p:clrMapOvr>
-  <mc:AlternateContent xmlns:mc="http://schemas.openxmlformats.org/markup-compatibility/2006">
-    <mc:Choice xmlns:p14="http://schemas.microsoft.com/office/powerpoint/2010/main" Requires="p14">
+  <mc:AlternateContent xmlns:mc="http://schemas.openxmlformats.org/markup-compatibility/2006" xmlns:p14="http://schemas.microsoft.com/office/powerpoint/2010/main">
+    <mc:Choice Requires="p14">
       <p:transition p14:dur="0"/>
     </mc:Choice>
-    <mc:Fallback>
+    <mc:Fallback xmlns="">
       <p:transition/>
     </mc:Fallback>
   </mc:AlternateContent>
@@ -6936,21 +7244,6 @@
 </file>
 
 <file path=customXml/item1.xml><?xml version="1.0" encoding="utf-8"?>
-<p:properties xmlns:p="http://schemas.microsoft.com/office/2006/metadata/properties" xmlns:xsi="http://www.w3.org/2001/XMLSchema-instance" xmlns:pc="http://schemas.microsoft.com/office/infopath/2007/PartnerControls">
-  <documentManagement/>
-</p:properties>
-</file>
-
-<file path=customXml/item2.xml><?xml version="1.0" encoding="utf-8"?>
-<?mso-contentType ?>
-<FormTemplates xmlns="http://schemas.microsoft.com/sharepoint/v3/contenttype/forms">
-  <Display>DocumentLibraryForm</Display>
-  <Edit>DocumentLibraryForm</Edit>
-  <New>DocumentLibraryForm</New>
-</FormTemplates>
-</file>
-
-<file path=customXml/item3.xml><?xml version="1.0" encoding="utf-8"?>
 <ct:contentTypeSchema xmlns:ct="http://schemas.microsoft.com/office/2006/metadata/contentType" xmlns:ma="http://schemas.microsoft.com/office/2006/metadata/properties/metaAttributes" ct:_="" ma:_="" ma:contentTypeName="Document" ma:contentTypeID="0x0101007C1D5F340F01F94FA2FD29A5E6DC872E" ma:contentTypeVersion="0" ma:contentTypeDescription="Create a new document." ma:contentTypeScope="" ma:versionID="f583bd66513a361a730282b6a794e352">
   <xsd:schema xmlns:xsd="http://www.w3.org/2001/XMLSchema" xmlns:xs="http://www.w3.org/2001/XMLSchema" xmlns:p="http://schemas.microsoft.com/office/2006/metadata/properties" targetNamespace="http://schemas.microsoft.com/office/2006/metadata/properties" ma:root="true" ma:fieldsID="6841151cf538834e171094e4faaf2d73">
     <xsd:element name="properties">
@@ -7064,17 +7357,33 @@
 </ct:contentTypeSchema>
 </file>
 
+<file path=customXml/item2.xml><?xml version="1.0" encoding="utf-8"?>
+<?mso-contentType ?>
+<FormTemplates xmlns="http://schemas.microsoft.com/sharepoint/v3/contenttype/forms">
+  <Display>DocumentLibraryForm</Display>
+  <Edit>DocumentLibraryForm</Edit>
+  <New>DocumentLibraryForm</New>
+</FormTemplates>
+</file>
+
+<file path=customXml/item3.xml><?xml version="1.0" encoding="utf-8"?>
+<p:properties xmlns:p="http://schemas.microsoft.com/office/2006/metadata/properties" xmlns:xsi="http://www.w3.org/2001/XMLSchema-instance" xmlns:pc="http://schemas.microsoft.com/office/infopath/2007/PartnerControls">
+  <documentManagement/>
+</p:properties>
+</file>
+
 <file path=customXml/itemProps1.xml><?xml version="1.0" encoding="utf-8"?>
-<ds:datastoreItem xmlns:ds="http://schemas.openxmlformats.org/officeDocument/2006/customXml" ds:itemID="{FF71E0A8-DA6F-4DC5-84AA-9AE90625C277}">
+<ds:datastoreItem xmlns:ds="http://schemas.openxmlformats.org/officeDocument/2006/customXml" ds:itemID="{29F17D79-05FE-43C7-A9B5-360E9D6B5ACC}">
   <ds:schemaRefs>
-    <ds:schemaRef ds:uri="http://schemas.microsoft.com/office/2006/documentManagement/types"/>
+    <ds:schemaRef ds:uri="http://schemas.microsoft.com/office/2006/metadata/contentType"/>
+    <ds:schemaRef ds:uri="http://schemas.microsoft.com/office/2006/metadata/properties/metaAttributes"/>
+    <ds:schemaRef ds:uri="http://www.w3.org/2001/XMLSchema"/>
+    <ds:schemaRef ds:uri="http://schemas.microsoft.com/office/2006/metadata/properties"/>
+    <ds:schemaRef ds:uri="http://schemas.openxmlformats.org/package/2006/metadata/core-properties"/>
     <ds:schemaRef ds:uri="http://purl.org/dc/elements/1.1/"/>
     <ds:schemaRef ds:uri="http://purl.org/dc/terms/"/>
-    <ds:schemaRef ds:uri="http://www.w3.org/XML/1998/namespace"/>
-    <ds:schemaRef ds:uri="http://schemas.microsoft.com/office/2006/metadata/properties"/>
+    <ds:schemaRef ds:uri="http://schemas.microsoft.com/internal/obd"/>
     <ds:schemaRef ds:uri="http://schemas.microsoft.com/office/infopath/2007/PartnerControls"/>
-    <ds:schemaRef ds:uri="http://schemas.openxmlformats.org/package/2006/metadata/core-properties"/>
-    <ds:schemaRef ds:uri="http://purl.org/dc/dcmitype/"/>
   </ds:schemaRefs>
 </ds:datastoreItem>
 </file>
@@ -7088,17 +7397,16 @@
 </file>
 
 <file path=customXml/itemProps3.xml><?xml version="1.0" encoding="utf-8"?>
-<ds:datastoreItem xmlns:ds="http://schemas.openxmlformats.org/officeDocument/2006/customXml" ds:itemID="{29F17D79-05FE-43C7-A9B5-360E9D6B5ACC}">
+<ds:datastoreItem xmlns:ds="http://schemas.openxmlformats.org/officeDocument/2006/customXml" ds:itemID="{FF71E0A8-DA6F-4DC5-84AA-9AE90625C277}">
   <ds:schemaRefs>
-    <ds:schemaRef ds:uri="http://schemas.microsoft.com/office/2006/metadata/contentType"/>
-    <ds:schemaRef ds:uri="http://schemas.microsoft.com/office/2006/metadata/properties/metaAttributes"/>
-    <ds:schemaRef ds:uri="http://www.w3.org/2001/XMLSchema"/>
-    <ds:schemaRef ds:uri="http://schemas.microsoft.com/office/2006/metadata/properties"/>
-    <ds:schemaRef ds:uri="http://schemas.openxmlformats.org/package/2006/metadata/core-properties"/>
+    <ds:schemaRef ds:uri="http://schemas.microsoft.com/office/2006/documentManagement/types"/>
     <ds:schemaRef ds:uri="http://purl.org/dc/elements/1.1/"/>
     <ds:schemaRef ds:uri="http://purl.org/dc/terms/"/>
-    <ds:schemaRef ds:uri="http://schemas.microsoft.com/internal/obd"/>
+    <ds:schemaRef ds:uri="http://www.w3.org/XML/1998/namespace"/>
+    <ds:schemaRef ds:uri="http://schemas.microsoft.com/office/2006/metadata/properties"/>
     <ds:schemaRef ds:uri="http://schemas.microsoft.com/office/infopath/2007/PartnerControls"/>
+    <ds:schemaRef ds:uri="http://schemas.openxmlformats.org/package/2006/metadata/core-properties"/>
+    <ds:schemaRef ds:uri="http://purl.org/dc/dcmitype/"/>
   </ds:schemaRefs>
 </ds:datastoreItem>
 </file>
</xml_diff>

<commit_message>
added in class group work
</commit_message>
<xml_diff>
--- a/03-UML.pptx
+++ b/03-UML.pptx
@@ -5,7 +5,7 @@
     <p:sldMasterId id="2147483912" r:id="rId4"/>
   </p:sldMasterIdLst>
   <p:notesMasterIdLst>
-    <p:notesMasterId r:id="rId22"/>
+    <p:notesMasterId r:id="rId23"/>
   </p:notesMasterIdLst>
   <p:sldIdLst>
     <p:sldId id="256" r:id="rId5"/>
@@ -24,7 +24,8 @@
     <p:sldId id="313" r:id="rId18"/>
     <p:sldId id="315" r:id="rId19"/>
     <p:sldId id="289" r:id="rId20"/>
-    <p:sldId id="279" r:id="rId21"/>
+    <p:sldId id="316" r:id="rId21"/>
+    <p:sldId id="279" r:id="rId22"/>
   </p:sldIdLst>
   <p:sldSz cx="12192000" cy="6858000"/>
   <p:notesSz cx="6858000" cy="9144000"/>
@@ -144,6 +145,7 @@
             <p14:sldId id="313"/>
             <p14:sldId id="315"/>
             <p14:sldId id="289"/>
+            <p14:sldId id="316"/>
             <p14:sldId id="279"/>
           </p14:sldIdLst>
         </p14:section>
@@ -4855,6 +4857,13 @@
       <p:transition/>
     </mc:Fallback>
   </mc:AlternateContent>
+  <p:timing>
+    <p:tnLst>
+      <p:par>
+        <p:cTn id="1" dur="indefinite" restart="never" nodeType="tmRoot"/>
+      </p:par>
+    </p:tnLst>
+  </p:timing>
 </p:sld>
 </file>
 
@@ -4988,6 +4997,13 @@
       <p:transition/>
     </mc:Fallback>
   </mc:AlternateContent>
+  <p:timing>
+    <p:tnLst>
+      <p:par>
+        <p:cTn id="1" dur="indefinite" restart="never" nodeType="tmRoot"/>
+      </p:par>
+    </p:tnLst>
+  </p:timing>
 </p:sld>
 </file>
 
@@ -5207,14 +5223,21 @@
   <p:clrMapOvr>
     <a:masterClrMapping/>
   </p:clrMapOvr>
-  <mc:AlternateContent xmlns:mc="http://schemas.openxmlformats.org/markup-compatibility/2006">
-    <mc:Choice xmlns:p14="http://schemas.microsoft.com/office/powerpoint/2010/main" Requires="p14">
+  <mc:AlternateContent xmlns:mc="http://schemas.openxmlformats.org/markup-compatibility/2006" xmlns:p14="http://schemas.microsoft.com/office/powerpoint/2010/main">
+    <mc:Choice Requires="p14">
       <p:transition p14:dur="0"/>
     </mc:Choice>
-    <mc:Fallback>
+    <mc:Fallback xmlns="">
       <p:transition/>
     </mc:Fallback>
   </mc:AlternateContent>
+  <p:timing>
+    <p:tnLst>
+      <p:par>
+        <p:cTn id="1" dur="indefinite" restart="never" nodeType="tmRoot"/>
+      </p:par>
+    </p:tnLst>
+  </p:timing>
 </p:sld>
 </file>
 
@@ -5333,14 +5356,21 @@
   <p:clrMapOvr>
     <a:masterClrMapping/>
   </p:clrMapOvr>
-  <mc:AlternateContent xmlns:mc="http://schemas.openxmlformats.org/markup-compatibility/2006">
-    <mc:Choice xmlns:p14="http://schemas.microsoft.com/office/powerpoint/2010/main" Requires="p14">
+  <mc:AlternateContent xmlns:mc="http://schemas.openxmlformats.org/markup-compatibility/2006" xmlns:p14="http://schemas.microsoft.com/office/powerpoint/2010/main">
+    <mc:Choice Requires="p14">
       <p:transition p14:dur="0"/>
     </mc:Choice>
-    <mc:Fallback>
+    <mc:Fallback xmlns="">
       <p:transition/>
     </mc:Fallback>
   </mc:AlternateContent>
+  <p:timing>
+    <p:tnLst>
+      <p:par>
+        <p:cTn id="1" dur="indefinite" restart="never" nodeType="tmRoot"/>
+      </p:par>
+    </p:tnLst>
+  </p:timing>
 </p:sld>
 </file>
 
@@ -5568,6 +5598,106 @@
           <a:p>
             <a:r>
               <a:rPr lang="en-CA" dirty="0" smtClean="0"/>
+              <a:t>Extra Credit</a:t>
+            </a:r>
+            <a:endParaRPr lang="en-CA" dirty="0"/>
+          </a:p>
+        </p:txBody>
+      </p:sp>
+      <p:sp>
+        <p:nvSpPr>
+          <p:cNvPr id="3" name="Content Placeholder 2"/>
+          <p:cNvSpPr>
+            <a:spLocks noGrp="1"/>
+          </p:cNvSpPr>
+          <p:nvPr>
+            <p:ph idx="1"/>
+          </p:nvPr>
+        </p:nvSpPr>
+        <p:spPr/>
+        <p:txBody>
+          <a:bodyPr/>
+          <a:lstStyle/>
+          <a:p>
+            <a:r>
+              <a:rPr lang="en-CA" dirty="0">
+                <a:hlinkClick r:id="rId2"/>
+              </a:rPr>
+              <a:t>http://bombermine.com/#/play</a:t>
+            </a:r>
+            <a:r>
+              <a:rPr lang="en-CA" dirty="0" smtClean="0">
+                <a:hlinkClick r:id="rId2"/>
+              </a:rPr>
+              <a:t>/</a:t>
+            </a:r>
+            <a:r>
+              <a:rPr lang="en-CA" dirty="0" smtClean="0"/>
+              <a:t> </a:t>
+            </a:r>
+            <a:endParaRPr lang="en-CA" dirty="0"/>
+          </a:p>
+        </p:txBody>
+      </p:sp>
+    </p:spTree>
+    <p:extLst>
+      <p:ext uri="{BB962C8B-B14F-4D97-AF65-F5344CB8AC3E}">
+        <p14:creationId xmlns:p14="http://schemas.microsoft.com/office/powerpoint/2010/main" val="851999394"/>
+      </p:ext>
+    </p:extLst>
+  </p:cSld>
+  <p:clrMapOvr>
+    <a:masterClrMapping/>
+  </p:clrMapOvr>
+  <mc:AlternateContent xmlns:mc="http://schemas.openxmlformats.org/markup-compatibility/2006">
+    <mc:Choice xmlns:p14="http://schemas.microsoft.com/office/powerpoint/2010/main" Requires="p14">
+      <p:transition spd="med" p14:dur="700">
+        <p:fade/>
+      </p:transition>
+    </mc:Choice>
+    <mc:Fallback>
+      <p:transition spd="med">
+        <p:fade/>
+      </p:transition>
+    </mc:Fallback>
+  </mc:AlternateContent>
+</p:sld>
+</file>
+
+<file path=ppt/slides/slide18.xml><?xml version="1.0" encoding="utf-8"?>
+<p:sld xmlns:a="http://schemas.openxmlformats.org/drawingml/2006/main" xmlns:r="http://schemas.openxmlformats.org/officeDocument/2006/relationships" xmlns:p="http://schemas.openxmlformats.org/presentationml/2006/main">
+  <p:cSld>
+    <p:spTree>
+      <p:nvGrpSpPr>
+        <p:cNvPr id="1" name=""/>
+        <p:cNvGrpSpPr/>
+        <p:nvPr/>
+      </p:nvGrpSpPr>
+      <p:grpSpPr>
+        <a:xfrm>
+          <a:off x="0" y="0"/>
+          <a:ext cx="0" cy="0"/>
+          <a:chOff x="0" y="0"/>
+          <a:chExt cx="0" cy="0"/>
+        </a:xfrm>
+      </p:grpSpPr>
+      <p:sp>
+        <p:nvSpPr>
+          <p:cNvPr id="2" name="Title 1"/>
+          <p:cNvSpPr>
+            <a:spLocks noGrp="1"/>
+          </p:cNvSpPr>
+          <p:nvPr>
+            <p:ph type="title"/>
+          </p:nvPr>
+        </p:nvSpPr>
+        <p:spPr/>
+        <p:txBody>
+          <a:bodyPr/>
+          <a:lstStyle/>
+          <a:p>
+            <a:r>
+              <a:rPr lang="en-CA" dirty="0" smtClean="0"/>
               <a:t>References</a:t>
             </a:r>
             <a:endParaRPr lang="en-CA" dirty="0"/>
@@ -5653,6 +5783,32 @@
               <a:rPr lang="en-CA" dirty="0" smtClean="0"/>
               <a:t> </a:t>
             </a:r>
+            <a:endParaRPr lang="en-CA" dirty="0" smtClean="0"/>
+          </a:p>
+          <a:p>
+            <a:pPr marL="457200" indent="-457200">
+              <a:buFont typeface="+mj-lt"/>
+              <a:buAutoNum type="arabicPeriod"/>
+            </a:pPr>
+            <a:r>
+              <a:rPr lang="en-CA" dirty="0">
+                <a:hlinkClick r:id="rId5"/>
+              </a:rPr>
+              <a:t>http://slides.com/dominiccharleyroy</a:t>
+            </a:r>
+            <a:r>
+              <a:rPr lang="en-CA" dirty="0" smtClean="0">
+                <a:hlinkClick r:id="rId5"/>
+              </a:rPr>
+              <a:t>/</a:t>
+            </a:r>
+            <a:endParaRPr lang="en-CA" dirty="0" smtClean="0"/>
+          </a:p>
+          <a:p>
+            <a:pPr marL="457200" indent="-457200">
+              <a:buFont typeface="+mj-lt"/>
+              <a:buAutoNum type="arabicPeriod"/>
+            </a:pPr>
             <a:endParaRPr lang="en-CA" dirty="0"/>
           </a:p>
         </p:txBody>
@@ -5916,11 +6072,7 @@
             </a:pPr>
             <a:r>
               <a:rPr lang="en-CA" b="1" dirty="0" smtClean="0"/>
-              <a:t>Extend: When one action can be replaced by </a:t>
-            </a:r>
-            <a:r>
-              <a:rPr lang="en-CA" b="1" dirty="0" smtClean="0"/>
-              <a:t>another (inheritance)</a:t>
+              <a:t>Extend: When one action can be replaced by another (inheritance)</a:t>
             </a:r>
             <a:endParaRPr lang="en-US" b="1" dirty="0"/>
           </a:p>
@@ -6627,14 +6779,21 @@
   <p:clrMapOvr>
     <a:masterClrMapping/>
   </p:clrMapOvr>
-  <mc:AlternateContent xmlns:mc="http://schemas.openxmlformats.org/markup-compatibility/2006">
-    <mc:Choice xmlns:p14="http://schemas.microsoft.com/office/powerpoint/2010/main" Requires="p14">
+  <mc:AlternateContent xmlns:mc="http://schemas.openxmlformats.org/markup-compatibility/2006" xmlns:p14="http://schemas.microsoft.com/office/powerpoint/2010/main">
+    <mc:Choice Requires="p14">
       <p:transition p14:dur="0"/>
     </mc:Choice>
-    <mc:Fallback>
+    <mc:Fallback xmlns="">
       <p:transition/>
     </mc:Fallback>
   </mc:AlternateContent>
+  <p:timing>
+    <p:tnLst>
+      <p:par>
+        <p:cTn id="1" dur="indefinite" restart="never" nodeType="tmRoot"/>
+      </p:par>
+    </p:tnLst>
+  </p:timing>
 </p:sld>
 </file>
 
@@ -7244,6 +7403,15 @@
 </file>
 
 <file path=customXml/item1.xml><?xml version="1.0" encoding="utf-8"?>
+<?mso-contentType ?>
+<FormTemplates xmlns="http://schemas.microsoft.com/sharepoint/v3/contenttype/forms">
+  <Display>DocumentLibraryForm</Display>
+  <Edit>DocumentLibraryForm</Edit>
+  <New>DocumentLibraryForm</New>
+</FormTemplates>
+</file>
+
+<file path=customXml/item2.xml><?xml version="1.0" encoding="utf-8"?>
 <ct:contentTypeSchema xmlns:ct="http://schemas.microsoft.com/office/2006/metadata/contentType" xmlns:ma="http://schemas.microsoft.com/office/2006/metadata/properties/metaAttributes" ct:_="" ma:_="" ma:contentTypeName="Document" ma:contentTypeID="0x0101007C1D5F340F01F94FA2FD29A5E6DC872E" ma:contentTypeVersion="0" ma:contentTypeDescription="Create a new document." ma:contentTypeScope="" ma:versionID="f583bd66513a361a730282b6a794e352">
   <xsd:schema xmlns:xsd="http://www.w3.org/2001/XMLSchema" xmlns:xs="http://www.w3.org/2001/XMLSchema" xmlns:p="http://schemas.microsoft.com/office/2006/metadata/properties" targetNamespace="http://schemas.microsoft.com/office/2006/metadata/properties" ma:root="true" ma:fieldsID="6841151cf538834e171094e4faaf2d73">
     <xsd:element name="properties">
@@ -7357,15 +7525,6 @@
 </ct:contentTypeSchema>
 </file>
 
-<file path=customXml/item2.xml><?xml version="1.0" encoding="utf-8"?>
-<?mso-contentType ?>
-<FormTemplates xmlns="http://schemas.microsoft.com/sharepoint/v3/contenttype/forms">
-  <Display>DocumentLibraryForm</Display>
-  <Edit>DocumentLibraryForm</Edit>
-  <New>DocumentLibraryForm</New>
-</FormTemplates>
-</file>
-
 <file path=customXml/item3.xml><?xml version="1.0" encoding="utf-8"?>
 <p:properties xmlns:p="http://schemas.microsoft.com/office/2006/metadata/properties" xmlns:xsi="http://www.w3.org/2001/XMLSchema-instance" xmlns:pc="http://schemas.microsoft.com/office/infopath/2007/PartnerControls">
   <documentManagement/>
@@ -7373,6 +7532,14 @@
 </file>
 
 <file path=customXml/itemProps1.xml><?xml version="1.0" encoding="utf-8"?>
+<ds:datastoreItem xmlns:ds="http://schemas.openxmlformats.org/officeDocument/2006/customXml" ds:itemID="{76B64549-C1F2-49EA-8B2D-5EF61BF1CE56}">
+  <ds:schemaRefs>
+    <ds:schemaRef ds:uri="http://schemas.microsoft.com/sharepoint/v3/contenttype/forms"/>
+  </ds:schemaRefs>
+</ds:datastoreItem>
+</file>
+
+<file path=customXml/itemProps2.xml><?xml version="1.0" encoding="utf-8"?>
 <ds:datastoreItem xmlns:ds="http://schemas.openxmlformats.org/officeDocument/2006/customXml" ds:itemID="{29F17D79-05FE-43C7-A9B5-360E9D6B5ACC}">
   <ds:schemaRefs>
     <ds:schemaRef ds:uri="http://schemas.microsoft.com/office/2006/metadata/contentType"/>
@@ -7384,14 +7551,6 @@
     <ds:schemaRef ds:uri="http://purl.org/dc/terms/"/>
     <ds:schemaRef ds:uri="http://schemas.microsoft.com/internal/obd"/>
     <ds:schemaRef ds:uri="http://schemas.microsoft.com/office/infopath/2007/PartnerControls"/>
-  </ds:schemaRefs>
-</ds:datastoreItem>
-</file>
-
-<file path=customXml/itemProps2.xml><?xml version="1.0" encoding="utf-8"?>
-<ds:datastoreItem xmlns:ds="http://schemas.openxmlformats.org/officeDocument/2006/customXml" ds:itemID="{76B64549-C1F2-49EA-8B2D-5EF61BF1CE56}">
-  <ds:schemaRefs>
-    <ds:schemaRef ds:uri="http://schemas.microsoft.com/sharepoint/v3/contenttype/forms"/>
   </ds:schemaRefs>
 </ds:datastoreItem>
 </file>

</xml_diff>